<commit_message>
updated powerpoint to have speaker notes
</commit_message>
<xml_diff>
--- a/careerResearchProject/DDK_Career_Spotlightsoftware_development.pptx
+++ b/careerResearchProject/DDK_Career_Spotlightsoftware_development.pptx
@@ -2345,6 +2345,351 @@
 </p:notesMaster>
 </file>
 
+<file path=ppt/notesSlides/notesSlide1.xml><?xml version="1.0" encoding="utf-8"?>
+<p:notes xmlns:a="http://schemas.openxmlformats.org/drawingml/2006/main" xmlns:r="http://schemas.openxmlformats.org/officeDocument/2006/relationships" xmlns:p="http://schemas.openxmlformats.org/presentationml/2006/main">
+  <p:cSld>
+    <p:spTree>
+      <p:nvGrpSpPr>
+        <p:cNvPr id="1" name=""/>
+        <p:cNvGrpSpPr/>
+        <p:nvPr/>
+      </p:nvGrpSpPr>
+      <p:grpSpPr>
+        <a:xfrm>
+          <a:off x="0" y="0"/>
+          <a:ext cx="0" cy="0"/>
+          <a:chOff x="0" y="0"/>
+          <a:chExt cx="0" cy="0"/>
+        </a:xfrm>
+      </p:grpSpPr>
+      <p:sp>
+        <p:nvSpPr>
+          <p:cNvPr id="2" name="Slide Image Placeholder 1"/>
+          <p:cNvSpPr>
+            <a:spLocks noGrp="1" noRot="1" noChangeAspect="1"/>
+          </p:cNvSpPr>
+          <p:nvPr>
+            <p:ph type="sldImg"/>
+          </p:nvPr>
+        </p:nvSpPr>
+        <p:spPr/>
+      </p:sp>
+      <p:sp>
+        <p:nvSpPr>
+          <p:cNvPr id="3" name="Notes Placeholder 2"/>
+          <p:cNvSpPr>
+            <a:spLocks noGrp="1"/>
+          </p:cNvSpPr>
+          <p:nvPr>
+            <p:ph type="body" idx="1"/>
+          </p:nvPr>
+        </p:nvSpPr>
+        <p:spPr/>
+        <p:txBody>
+          <a:bodyPr/>
+          <a:lstStyle/>
+          <a:p>
+            <a:r>
+              <a:rPr lang="en-US" dirty="0"/>
+              <a:t>A basic overview of what the career is all about</a:t>
+            </a:r>
+          </a:p>
+        </p:txBody>
+      </p:sp>
+      <p:sp>
+        <p:nvSpPr>
+          <p:cNvPr id="4" name="Slide Number Placeholder 3"/>
+          <p:cNvSpPr>
+            <a:spLocks noGrp="1"/>
+          </p:cNvSpPr>
+          <p:nvPr>
+            <p:ph type="sldNum" sz="quarter" idx="5"/>
+          </p:nvPr>
+        </p:nvSpPr>
+        <p:spPr/>
+        <p:txBody>
+          <a:bodyPr/>
+          <a:lstStyle/>
+          <a:p>
+            <a:fld id="{EF8CE074-177B-453D-A627-7CC091BD2AE0}" type="slidenum">
+              <a:rPr lang="en-US" smtClean="0"/>
+              <a:t>2</a:t>
+            </a:fld>
+            <a:endParaRPr lang="en-US"/>
+          </a:p>
+        </p:txBody>
+      </p:sp>
+    </p:spTree>
+    <p:extLst>
+      <p:ext uri="{BB962C8B-B14F-4D97-AF65-F5344CB8AC3E}">
+        <p14:creationId xmlns:p14="http://schemas.microsoft.com/office/powerpoint/2010/main" val="220887057"/>
+      </p:ext>
+    </p:extLst>
+  </p:cSld>
+  <p:clrMapOvr>
+    <a:masterClrMapping/>
+  </p:clrMapOvr>
+</p:notes>
+</file>
+
+<file path=ppt/notesSlides/notesSlide2.xml><?xml version="1.0" encoding="utf-8"?>
+<p:notes xmlns:a="http://schemas.openxmlformats.org/drawingml/2006/main" xmlns:r="http://schemas.openxmlformats.org/officeDocument/2006/relationships" xmlns:p="http://schemas.openxmlformats.org/presentationml/2006/main">
+  <p:cSld>
+    <p:spTree>
+      <p:nvGrpSpPr>
+        <p:cNvPr id="1" name=""/>
+        <p:cNvGrpSpPr/>
+        <p:nvPr/>
+      </p:nvGrpSpPr>
+      <p:grpSpPr>
+        <a:xfrm>
+          <a:off x="0" y="0"/>
+          <a:ext cx="0" cy="0"/>
+          <a:chOff x="0" y="0"/>
+          <a:chExt cx="0" cy="0"/>
+        </a:xfrm>
+      </p:grpSpPr>
+      <p:sp>
+        <p:nvSpPr>
+          <p:cNvPr id="2" name="Slide Image Placeholder 1"/>
+          <p:cNvSpPr>
+            <a:spLocks noGrp="1" noRot="1" noChangeAspect="1"/>
+          </p:cNvSpPr>
+          <p:nvPr>
+            <p:ph type="sldImg"/>
+          </p:nvPr>
+        </p:nvSpPr>
+        <p:spPr/>
+      </p:sp>
+      <p:sp>
+        <p:nvSpPr>
+          <p:cNvPr id="3" name="Notes Placeholder 2"/>
+          <p:cNvSpPr>
+            <a:spLocks noGrp="1"/>
+          </p:cNvSpPr>
+          <p:nvPr>
+            <p:ph type="body" idx="1"/>
+          </p:nvPr>
+        </p:nvSpPr>
+        <p:spPr/>
+        <p:txBody>
+          <a:bodyPr/>
+          <a:lstStyle/>
+          <a:p>
+            <a:r>
+              <a:rPr lang="en-US" dirty="0"/>
+              <a:t>Communication, problem solving, patience, time management, and collaboration all are very important for the job!</a:t>
+            </a:r>
+          </a:p>
+        </p:txBody>
+      </p:sp>
+      <p:sp>
+        <p:nvSpPr>
+          <p:cNvPr id="4" name="Slide Number Placeholder 3"/>
+          <p:cNvSpPr>
+            <a:spLocks noGrp="1"/>
+          </p:cNvSpPr>
+          <p:nvPr>
+            <p:ph type="sldNum" sz="quarter" idx="5"/>
+          </p:nvPr>
+        </p:nvSpPr>
+        <p:spPr/>
+        <p:txBody>
+          <a:bodyPr/>
+          <a:lstStyle/>
+          <a:p>
+            <a:fld id="{EF8CE074-177B-453D-A627-7CC091BD2AE0}" type="slidenum">
+              <a:rPr lang="en-US" smtClean="0"/>
+              <a:t>4</a:t>
+            </a:fld>
+            <a:endParaRPr lang="en-US"/>
+          </a:p>
+        </p:txBody>
+      </p:sp>
+    </p:spTree>
+    <p:extLst>
+      <p:ext uri="{BB962C8B-B14F-4D97-AF65-F5344CB8AC3E}">
+        <p14:creationId xmlns:p14="http://schemas.microsoft.com/office/powerpoint/2010/main" val="1805027793"/>
+      </p:ext>
+    </p:extLst>
+  </p:cSld>
+  <p:clrMapOvr>
+    <a:masterClrMapping/>
+  </p:clrMapOvr>
+</p:notes>
+</file>
+
+<file path=ppt/notesSlides/notesSlide3.xml><?xml version="1.0" encoding="utf-8"?>
+<p:notes xmlns:a="http://schemas.openxmlformats.org/drawingml/2006/main" xmlns:r="http://schemas.openxmlformats.org/officeDocument/2006/relationships" xmlns:p="http://schemas.openxmlformats.org/presentationml/2006/main">
+  <p:cSld>
+    <p:spTree>
+      <p:nvGrpSpPr>
+        <p:cNvPr id="1" name=""/>
+        <p:cNvGrpSpPr/>
+        <p:nvPr/>
+      </p:nvGrpSpPr>
+      <p:grpSpPr>
+        <a:xfrm>
+          <a:off x="0" y="0"/>
+          <a:ext cx="0" cy="0"/>
+          <a:chOff x="0" y="0"/>
+          <a:chExt cx="0" cy="0"/>
+        </a:xfrm>
+      </p:grpSpPr>
+      <p:sp>
+        <p:nvSpPr>
+          <p:cNvPr id="2" name="Slide Image Placeholder 1"/>
+          <p:cNvSpPr>
+            <a:spLocks noGrp="1" noRot="1" noChangeAspect="1"/>
+          </p:cNvSpPr>
+          <p:nvPr>
+            <p:ph type="sldImg"/>
+          </p:nvPr>
+        </p:nvSpPr>
+        <p:spPr/>
+      </p:sp>
+      <p:sp>
+        <p:nvSpPr>
+          <p:cNvPr id="3" name="Notes Placeholder 2"/>
+          <p:cNvSpPr>
+            <a:spLocks noGrp="1"/>
+          </p:cNvSpPr>
+          <p:nvPr>
+            <p:ph type="body" idx="1"/>
+          </p:nvPr>
+        </p:nvSpPr>
+        <p:spPr/>
+        <p:txBody>
+          <a:bodyPr/>
+          <a:lstStyle/>
+          <a:p>
+            <a:endParaRPr lang="en-US" dirty="0"/>
+          </a:p>
+        </p:txBody>
+      </p:sp>
+      <p:sp>
+        <p:nvSpPr>
+          <p:cNvPr id="4" name="Slide Number Placeholder 3"/>
+          <p:cNvSpPr>
+            <a:spLocks noGrp="1"/>
+          </p:cNvSpPr>
+          <p:nvPr>
+            <p:ph type="sldNum" sz="quarter" idx="5"/>
+          </p:nvPr>
+        </p:nvSpPr>
+        <p:spPr/>
+        <p:txBody>
+          <a:bodyPr/>
+          <a:lstStyle/>
+          <a:p>
+            <a:fld id="{EF8CE074-177B-453D-A627-7CC091BD2AE0}" type="slidenum">
+              <a:rPr lang="en-US" smtClean="0"/>
+              <a:t>7</a:t>
+            </a:fld>
+            <a:endParaRPr lang="en-US"/>
+          </a:p>
+        </p:txBody>
+      </p:sp>
+    </p:spTree>
+    <p:extLst>
+      <p:ext uri="{BB962C8B-B14F-4D97-AF65-F5344CB8AC3E}">
+        <p14:creationId xmlns:p14="http://schemas.microsoft.com/office/powerpoint/2010/main" val="3375552139"/>
+      </p:ext>
+    </p:extLst>
+  </p:cSld>
+  <p:clrMapOvr>
+    <a:masterClrMapping/>
+  </p:clrMapOvr>
+</p:notes>
+</file>
+
+<file path=ppt/notesSlides/notesSlide4.xml><?xml version="1.0" encoding="utf-8"?>
+<p:notes xmlns:a="http://schemas.openxmlformats.org/drawingml/2006/main" xmlns:r="http://schemas.openxmlformats.org/officeDocument/2006/relationships" xmlns:p="http://schemas.openxmlformats.org/presentationml/2006/main">
+  <p:cSld>
+    <p:spTree>
+      <p:nvGrpSpPr>
+        <p:cNvPr id="1" name=""/>
+        <p:cNvGrpSpPr/>
+        <p:nvPr/>
+      </p:nvGrpSpPr>
+      <p:grpSpPr>
+        <a:xfrm>
+          <a:off x="0" y="0"/>
+          <a:ext cx="0" cy="0"/>
+          <a:chOff x="0" y="0"/>
+          <a:chExt cx="0" cy="0"/>
+        </a:xfrm>
+      </p:grpSpPr>
+      <p:sp>
+        <p:nvSpPr>
+          <p:cNvPr id="2" name="Slide Image Placeholder 1"/>
+          <p:cNvSpPr>
+            <a:spLocks noGrp="1" noRot="1" noChangeAspect="1"/>
+          </p:cNvSpPr>
+          <p:nvPr>
+            <p:ph type="sldImg"/>
+          </p:nvPr>
+        </p:nvSpPr>
+        <p:spPr/>
+      </p:sp>
+      <p:sp>
+        <p:nvSpPr>
+          <p:cNvPr id="3" name="Notes Placeholder 2"/>
+          <p:cNvSpPr>
+            <a:spLocks noGrp="1"/>
+          </p:cNvSpPr>
+          <p:nvPr>
+            <p:ph type="body" idx="1"/>
+          </p:nvPr>
+        </p:nvSpPr>
+        <p:spPr/>
+        <p:txBody>
+          <a:bodyPr/>
+          <a:lstStyle/>
+          <a:p>
+            <a:r>
+              <a:rPr lang="en-US" dirty="0"/>
+              <a:t>Data might not be accurate, but it’s mostly serving as a visual for how the field is still growing</a:t>
+            </a:r>
+          </a:p>
+        </p:txBody>
+      </p:sp>
+      <p:sp>
+        <p:nvSpPr>
+          <p:cNvPr id="4" name="Slide Number Placeholder 3"/>
+          <p:cNvSpPr>
+            <a:spLocks noGrp="1"/>
+          </p:cNvSpPr>
+          <p:nvPr>
+            <p:ph type="sldNum" sz="quarter" idx="5"/>
+          </p:nvPr>
+        </p:nvSpPr>
+        <p:spPr/>
+        <p:txBody>
+          <a:bodyPr/>
+          <a:lstStyle/>
+          <a:p>
+            <a:fld id="{EF8CE074-177B-453D-A627-7CC091BD2AE0}" type="slidenum">
+              <a:rPr lang="en-US" smtClean="0"/>
+              <a:t>8</a:t>
+            </a:fld>
+            <a:endParaRPr lang="en-US"/>
+          </a:p>
+        </p:txBody>
+      </p:sp>
+    </p:spTree>
+    <p:extLst>
+      <p:ext uri="{BB962C8B-B14F-4D97-AF65-F5344CB8AC3E}">
+        <p14:creationId xmlns:p14="http://schemas.microsoft.com/office/powerpoint/2010/main" val="499972470"/>
+      </p:ext>
+    </p:extLst>
+  </p:cSld>
+  <p:clrMapOvr>
+    <a:masterClrMapping/>
+  </p:clrMapOvr>
+</p:notes>
+</file>
+
 <file path=ppt/slideLayouts/slideLayout1.xml><?xml version="1.0" encoding="utf-8"?>
 <p:sldLayout xmlns:a="http://schemas.openxmlformats.org/drawingml/2006/main" xmlns:r="http://schemas.openxmlformats.org/officeDocument/2006/relationships" xmlns:p="http://schemas.openxmlformats.org/presentationml/2006/main" type="title" preserve="1">
   <p:cSld name="Title Slide">
@@ -3798,13 +4143,13 @@
           <p:nvPr/>
         </p:nvPicPr>
         <p:blipFill>
-          <a:blip r:embed="rId2">
+          <a:blip r:embed="rId3">
             <a:extLst>
               <a:ext uri="{28A0092B-C50C-407E-A947-70E740481C1C}">
                 <a14:useLocalDpi xmlns:a14="http://schemas.microsoft.com/office/drawing/2010/main" val="0"/>
               </a:ext>
               <a:ext uri="{96DAC541-7B7A-43D3-8B79-37D633B846F1}">
-                <asvg:svgBlip xmlns:asvg="http://schemas.microsoft.com/office/drawing/2016/SVG/main" r:embed="rId3"/>
+                <asvg:svgBlip xmlns:asvg="http://schemas.microsoft.com/office/drawing/2016/SVG/main" r:embed="rId4"/>
               </a:ext>
             </a:extLst>
           </a:blip>
@@ -4468,13 +4813,13 @@
           <p:nvPr/>
         </p:nvPicPr>
         <p:blipFill>
-          <a:blip r:embed="rId2">
+          <a:blip r:embed="rId3">
             <a:extLst>
               <a:ext uri="{28A0092B-C50C-407E-A947-70E740481C1C}">
                 <a14:useLocalDpi xmlns:a14="http://schemas.microsoft.com/office/drawing/2010/main" val="0"/>
               </a:ext>
               <a:ext uri="{96DAC541-7B7A-43D3-8B79-37D633B846F1}">
-                <asvg:svgBlip xmlns:asvg="http://schemas.microsoft.com/office/drawing/2016/SVG/main" r:embed="rId3"/>
+                <asvg:svgBlip xmlns:asvg="http://schemas.microsoft.com/office/drawing/2016/SVG/main" r:embed="rId4"/>
               </a:ext>
             </a:extLst>
           </a:blip>
@@ -4507,13 +4852,13 @@
           <p:nvPr/>
         </p:nvPicPr>
         <p:blipFill>
-          <a:blip r:embed="rId4">
+          <a:blip r:embed="rId5">
             <a:extLst>
               <a:ext uri="{28A0092B-C50C-407E-A947-70E740481C1C}">
                 <a14:useLocalDpi xmlns:a14="http://schemas.microsoft.com/office/drawing/2010/main" val="0"/>
               </a:ext>
               <a:ext uri="{96DAC541-7B7A-43D3-8B79-37D633B846F1}">
-                <asvg:svgBlip xmlns:asvg="http://schemas.microsoft.com/office/drawing/2016/SVG/main" r:embed="rId5"/>
+                <asvg:svgBlip xmlns:asvg="http://schemas.microsoft.com/office/drawing/2016/SVG/main" r:embed="rId6"/>
               </a:ext>
             </a:extLst>
           </a:blip>
@@ -4546,13 +4891,13 @@
           <p:nvPr/>
         </p:nvPicPr>
         <p:blipFill>
-          <a:blip r:embed="rId6">
+          <a:blip r:embed="rId7">
             <a:extLst>
               <a:ext uri="{28A0092B-C50C-407E-A947-70E740481C1C}">
                 <a14:useLocalDpi xmlns:a14="http://schemas.microsoft.com/office/drawing/2010/main" val="0"/>
               </a:ext>
               <a:ext uri="{96DAC541-7B7A-43D3-8B79-37D633B846F1}">
-                <asvg:svgBlip xmlns:asvg="http://schemas.microsoft.com/office/drawing/2016/SVG/main" r:embed="rId7"/>
+                <asvg:svgBlip xmlns:asvg="http://schemas.microsoft.com/office/drawing/2016/SVG/main" r:embed="rId8"/>
               </a:ext>
             </a:extLst>
           </a:blip>
@@ -5500,13 +5845,13 @@
           <p:nvPr/>
         </p:nvPicPr>
         <p:blipFill>
-          <a:blip r:embed="rId2">
+          <a:blip r:embed="rId3">
             <a:extLst>
               <a:ext uri="{28A0092B-C50C-407E-A947-70E740481C1C}">
                 <a14:useLocalDpi xmlns:a14="http://schemas.microsoft.com/office/drawing/2010/main" val="0"/>
               </a:ext>
               <a:ext uri="{96DAC541-7B7A-43D3-8B79-37D633B846F1}">
-                <asvg:svgBlip xmlns:asvg="http://schemas.microsoft.com/office/drawing/2016/SVG/main" r:embed="rId3"/>
+                <asvg:svgBlip xmlns:asvg="http://schemas.microsoft.com/office/drawing/2016/SVG/main" r:embed="rId4"/>
               </a:ext>
             </a:extLst>
           </a:blip>
@@ -5711,7 +6056,7 @@
           <p:nvPr>
             <p:extLst>
               <p:ext uri="{D42A27DB-BD31-4B8C-83A1-F6EECF244321}">
-                <p14:modId xmlns:p14="http://schemas.microsoft.com/office/powerpoint/2010/main" val="4248346843"/>
+                <p14:modId xmlns:p14="http://schemas.microsoft.com/office/powerpoint/2010/main" val="2550533072"/>
               </p:ext>
             </p:extLst>
           </p:nvPr>
@@ -5724,12 +6069,12 @@
           <a:graphicData uri="http://schemas.openxmlformats.org/presentationml/2006/ole">
             <mc:AlternateContent xmlns:mc="http://schemas.openxmlformats.org/markup-compatibility/2006">
               <mc:Choice xmlns:v="urn:schemas-microsoft-com:vml" Requires="v">
-                <p:oleObj name="Worksheet" r:id="rId2" imgW="1638348" imgH="4086322" progId="Excel.Sheet.12">
+                <p:oleObj spid="_x0000_s1033" name="Worksheet" r:id="rId4" imgW="1638348" imgH="4086322" progId="Excel.Sheet.12">
                   <p:link updateAutomatic="1"/>
                 </p:oleObj>
               </mc:Choice>
               <mc:Fallback>
-                <p:oleObj name="Worksheet" r:id="rId2" imgW="1638348" imgH="4086322" progId="Excel.Sheet.12">
+                <p:oleObj name="Worksheet" r:id="rId4" imgW="1638348" imgH="4086322" progId="Excel.Sheet.12">
                   <p:link updateAutomatic="1"/>
                   <p:pic>
                     <p:nvPicPr>
@@ -5744,7 +6089,7 @@
                       <p:nvPr/>
                     </p:nvPicPr>
                     <p:blipFill>
-                      <a:blip r:embed="rId3"/>
+                      <a:blip r:embed="rId5"/>
                       <a:stretch>
                         <a:fillRect/>
                       </a:stretch>
@@ -5791,7 +6136,7 @@
         </p:xfrm>
         <a:graphic>
           <a:graphicData uri="http://schemas.openxmlformats.org/drawingml/2006/chart">
-            <c:chart xmlns:c="http://schemas.openxmlformats.org/drawingml/2006/chart" xmlns:r="http://schemas.openxmlformats.org/officeDocument/2006/relationships" r:id="rId4"/>
+            <c:chart xmlns:c="http://schemas.openxmlformats.org/drawingml/2006/chart" xmlns:r="http://schemas.openxmlformats.org/officeDocument/2006/relationships" r:id="rId6"/>
           </a:graphicData>
         </a:graphic>
       </p:graphicFrame>

</xml_diff>

<commit_message>
Checked that all icons have alt text
</commit_message>
<xml_diff>
--- a/careerResearchProject/DDK_Career_Spotlightsoftware_development.pptx
+++ b/careerResearchProject/DDK_Career_Spotlightsoftware_development.pptx
@@ -6056,7 +6056,7 @@
           <p:nvPr>
             <p:extLst>
               <p:ext uri="{D42A27DB-BD31-4B8C-83A1-F6EECF244321}">
-                <p14:modId xmlns:p14="http://schemas.microsoft.com/office/powerpoint/2010/main" val="2550533072"/>
+                <p14:modId xmlns:p14="http://schemas.microsoft.com/office/powerpoint/2010/main" val="1315149420"/>
               </p:ext>
             </p:extLst>
           </p:nvPr>
@@ -6069,7 +6069,7 @@
           <a:graphicData uri="http://schemas.openxmlformats.org/presentationml/2006/ole">
             <mc:AlternateContent xmlns:mc="http://schemas.openxmlformats.org/markup-compatibility/2006">
               <mc:Choice xmlns:v="urn:schemas-microsoft-com:vml" Requires="v">
-                <p:oleObj spid="_x0000_s1033" name="Worksheet" r:id="rId4" imgW="1638348" imgH="4086322" progId="Excel.Sheet.12">
+                <p:oleObj spid="_x0000_s1038" name="Worksheet" r:id="rId4" imgW="1638348" imgH="4086322" progId="Excel.Sheet.12">
                   <p:link updateAutomatic="1"/>
                 </p:oleObj>
               </mc:Choice>

</xml_diff>